<commit_message>
final 02 prelecture commit
</commit_message>
<xml_diff>
--- a/figs/02A-getting-started-images.pptx
+++ b/figs/02A-getting-started-images.pptx
@@ -8,7 +8,7 @@
     <p:notesMasterId r:id="rId3"/>
   </p:notesMasterIdLst>
   <p:sldIdLst>
-    <p:sldId id="345" r:id="rId2"/>
+    <p:sldId id="346" r:id="rId2"/>
   </p:sldIdLst>
   <p:sldSz cx="9144000" cy="6858000" type="screen4x3"/>
   <p:notesSz cx="6858000" cy="9144000"/>
@@ -2717,10 +2717,10 @@
       </p:grpSpPr>
       <p:sp>
         <p:nvSpPr>
-          <p:cNvPr id="18" name="Rectangle 17">
+          <p:cNvPr id="9" name="Folded Corner 8">
             <a:extLst>
               <a:ext uri="{FF2B5EF4-FFF2-40B4-BE49-F238E27FC236}">
-                <a16:creationId xmlns:a16="http://schemas.microsoft.com/office/drawing/2014/main" id="{EABB2835-DE54-ED49-80F8-9D7F1DDCE1B0}"/>
+                <a16:creationId xmlns:a16="http://schemas.microsoft.com/office/drawing/2014/main" id="{7F488CC9-D387-BE44-A014-E5BC78D9C447}"/>
               </a:ext>
             </a:extLst>
           </p:cNvPr>
@@ -2729,8 +2729,67 @@
         </p:nvSpPr>
         <p:spPr>
           <a:xfrm>
-            <a:off x="3493476" y="895501"/>
-            <a:ext cx="2771224" cy="5962499"/>
+            <a:off x="856776" y="2299624"/>
+            <a:ext cx="1216607" cy="1644362"/>
+          </a:xfrm>
+          <a:prstGeom prst="foldedCorner">
+            <a:avLst>
+              <a:gd name="adj" fmla="val 28990"/>
+            </a:avLst>
+          </a:prstGeom>
+          <a:ln/>
+          <a:extLst>
+            <a:ext uri="{C572A759-6A51-4108-AA02-DFA0A04FC94B}">
+              <ma14:wrappingTextBoxFlag xmlns:ma14="http://schemas.microsoft.com/office/mac/drawingml/2011/main" xmlns="" val="1"/>
+            </a:ext>
+          </a:extLst>
+        </p:spPr>
+        <p:style>
+          <a:lnRef idx="1">
+            <a:schemeClr val="dk1"/>
+          </a:lnRef>
+          <a:fillRef idx="2">
+            <a:schemeClr val="dk1"/>
+          </a:fillRef>
+          <a:effectRef idx="1">
+            <a:schemeClr val="dk1"/>
+          </a:effectRef>
+          <a:fontRef idx="minor">
+            <a:schemeClr val="dk1"/>
+          </a:fontRef>
+        </p:style>
+        <p:txBody>
+          <a:bodyPr wrap="square" lIns="0" tIns="0" rIns="0" bIns="0" rtlCol="0" anchor="ctr">
+            <a:noAutofit/>
+          </a:bodyPr>
+          <a:lstStyle/>
+          <a:p>
+            <a:pPr algn="ctr"/>
+            <a:endParaRPr lang="en-US" sz="2400" i="0" dirty="0">
+              <a:uFill>
+                <a:solidFill/>
+              </a:uFill>
+              <a:latin typeface="+mj-lt"/>
+            </a:endParaRPr>
+          </a:p>
+        </p:txBody>
+      </p:sp>
+      <p:sp>
+        <p:nvSpPr>
+          <p:cNvPr id="20" name="Rectangle 19">
+            <a:extLst>
+              <a:ext uri="{FF2B5EF4-FFF2-40B4-BE49-F238E27FC236}">
+                <a16:creationId xmlns:a16="http://schemas.microsoft.com/office/drawing/2014/main" id="{8021A8BF-975D-8848-B7E3-D3EE49E33411}"/>
+              </a:ext>
+            </a:extLst>
+          </p:cNvPr>
+          <p:cNvSpPr/>
+          <p:nvPr/>
+        </p:nvSpPr>
+        <p:spPr>
+          <a:xfrm>
+            <a:off x="2276089" y="895500"/>
+            <a:ext cx="2103931" cy="5962499"/>
           </a:xfrm>
           <a:prstGeom prst="rect">
             <a:avLst/>
@@ -2744,7 +2803,7 @@
           </a:ln>
           <a:extLst>
             <a:ext uri="{C572A759-6A51-4108-AA02-DFA0A04FC94B}">
-              <ma14:wrappingTextBoxFlag xmlns="" xmlns:ma14="http://schemas.microsoft.com/office/mac/drawingml/2011/main" val="1"/>
+              <ma14:wrappingTextBoxFlag xmlns:ma14="http://schemas.microsoft.com/office/mac/drawingml/2011/main" xmlns="" val="1"/>
             </a:ext>
           </a:extLst>
         </p:spPr>
@@ -2763,7 +2822,198 @@
           </a:fontRef>
         </p:style>
         <p:txBody>
-          <a:bodyPr wrap="none" lIns="0" tIns="0" rIns="0" bIns="0" rtlCol="0" anchor="ctr">
+          <a:bodyPr wrap="square" lIns="0" tIns="0" rIns="0" bIns="0" rtlCol="0" anchor="ctr">
+            <a:spAutoFit/>
+          </a:bodyPr>
+          <a:lstStyle/>
+          <a:p>
+            <a:pPr algn="ctr"/>
+            <a:endParaRPr lang="en-US" sz="2400" i="0" dirty="0">
+              <a:uFill>
+                <a:solidFill/>
+              </a:uFill>
+              <a:latin typeface="+mj-lt"/>
+            </a:endParaRPr>
+          </a:p>
+        </p:txBody>
+      </p:sp>
+      <p:sp>
+        <p:nvSpPr>
+          <p:cNvPr id="22" name="Folded Corner 21">
+            <a:extLst>
+              <a:ext uri="{FF2B5EF4-FFF2-40B4-BE49-F238E27FC236}">
+                <a16:creationId xmlns:a16="http://schemas.microsoft.com/office/drawing/2014/main" id="{559889E2-1919-1A42-B8F9-039E58E55869}"/>
+              </a:ext>
+            </a:extLst>
+          </p:cNvPr>
+          <p:cNvSpPr/>
+          <p:nvPr/>
+        </p:nvSpPr>
+        <p:spPr>
+          <a:xfrm>
+            <a:off x="2969314" y="2299624"/>
+            <a:ext cx="1236717" cy="1649873"/>
+          </a:xfrm>
+          <a:prstGeom prst="foldedCorner">
+            <a:avLst>
+              <a:gd name="adj" fmla="val 28990"/>
+            </a:avLst>
+          </a:prstGeom>
+          <a:ln/>
+          <a:extLst>
+            <a:ext uri="{C572A759-6A51-4108-AA02-DFA0A04FC94B}">
+              <ma14:wrappingTextBoxFlag xmlns:ma14="http://schemas.microsoft.com/office/mac/drawingml/2011/main" xmlns="" val="1"/>
+            </a:ext>
+          </a:extLst>
+        </p:spPr>
+        <p:style>
+          <a:lnRef idx="1">
+            <a:schemeClr val="dk1"/>
+          </a:lnRef>
+          <a:fillRef idx="2">
+            <a:schemeClr val="dk1"/>
+          </a:fillRef>
+          <a:effectRef idx="1">
+            <a:schemeClr val="dk1"/>
+          </a:effectRef>
+          <a:fontRef idx="minor">
+            <a:schemeClr val="dk1"/>
+          </a:fontRef>
+        </p:style>
+        <p:txBody>
+          <a:bodyPr wrap="square" lIns="0" tIns="0" rIns="0" bIns="0" rtlCol="0" anchor="ctr">
+            <a:noAutofit/>
+          </a:bodyPr>
+          <a:lstStyle/>
+          <a:p>
+            <a:pPr algn="ctr"/>
+            <a:endParaRPr lang="en-US" sz="2400" i="0" dirty="0">
+              <a:uFill>
+                <a:solidFill/>
+              </a:uFill>
+              <a:latin typeface="+mj-lt"/>
+            </a:endParaRPr>
+          </a:p>
+        </p:txBody>
+      </p:sp>
+      <p:sp>
+        <p:nvSpPr>
+          <p:cNvPr id="25" name="Right Arrow 24">
+            <a:extLst>
+              <a:ext uri="{FF2B5EF4-FFF2-40B4-BE49-F238E27FC236}">
+                <a16:creationId xmlns:a16="http://schemas.microsoft.com/office/drawing/2014/main" id="{0DCE8B30-285E-024B-8BB1-1B59E1EF7C35}"/>
+              </a:ext>
+            </a:extLst>
+          </p:cNvPr>
+          <p:cNvSpPr/>
+          <p:nvPr/>
+        </p:nvSpPr>
+        <p:spPr>
+          <a:xfrm>
+            <a:off x="1614901" y="2490588"/>
+            <a:ext cx="1575401" cy="901381"/>
+          </a:xfrm>
+          <a:prstGeom prst="rightArrow">
+            <a:avLst/>
+          </a:prstGeom>
+          <a:ln/>
+          <a:extLst>
+            <a:ext uri="{C572A759-6A51-4108-AA02-DFA0A04FC94B}">
+              <ma14:wrappingTextBoxFlag xmlns:ma14="http://schemas.microsoft.com/office/mac/drawingml/2011/main" xmlns="" val="1"/>
+            </a:ext>
+          </a:extLst>
+        </p:spPr>
+        <p:style>
+          <a:lnRef idx="2">
+            <a:schemeClr val="dk1"/>
+          </a:lnRef>
+          <a:fillRef idx="1">
+            <a:schemeClr val="lt1"/>
+          </a:fillRef>
+          <a:effectRef idx="0">
+            <a:schemeClr val="dk1"/>
+          </a:effectRef>
+          <a:fontRef idx="minor">
+            <a:schemeClr val="dk1"/>
+          </a:fontRef>
+        </p:style>
+        <p:txBody>
+          <a:bodyPr wrap="square" lIns="0" tIns="0" rIns="0" bIns="0" rtlCol="0" anchor="ctr">
+            <a:noAutofit/>
+          </a:bodyPr>
+          <a:lstStyle/>
+          <a:p>
+            <a:pPr algn="ctr"/>
+            <a:r>
+              <a:rPr lang="en-US" sz="2000" i="0" dirty="0" err="1">
+                <a:uFill>
+                  <a:solidFill/>
+                </a:uFill>
+                <a:latin typeface="+mj-lt"/>
+              </a:rPr>
+              <a:t>git</a:t>
+            </a:r>
+            <a:r>
+              <a:rPr lang="en-US" sz="2000" i="0" dirty="0">
+                <a:uFill>
+                  <a:solidFill/>
+                </a:uFill>
+                <a:latin typeface="+mj-lt"/>
+              </a:rPr>
+              <a:t> add</a:t>
+            </a:r>
+          </a:p>
+        </p:txBody>
+      </p:sp>
+      <p:sp>
+        <p:nvSpPr>
+          <p:cNvPr id="18" name="Rectangle 17">
+            <a:extLst>
+              <a:ext uri="{FF2B5EF4-FFF2-40B4-BE49-F238E27FC236}">
+                <a16:creationId xmlns:a16="http://schemas.microsoft.com/office/drawing/2014/main" id="{EABB2835-DE54-ED49-80F8-9D7F1DDCE1B0}"/>
+              </a:ext>
+            </a:extLst>
+          </p:cNvPr>
+          <p:cNvSpPr/>
+          <p:nvPr/>
+        </p:nvSpPr>
+        <p:spPr>
+          <a:xfrm>
+            <a:off x="4380022" y="895501"/>
+            <a:ext cx="2359255" cy="5962499"/>
+          </a:xfrm>
+          <a:prstGeom prst="rect">
+            <a:avLst/>
+          </a:prstGeom>
+          <a:gradFill flip="none" rotWithShape="1">
+            <a:lin ang="0" scaled="1"/>
+            <a:tileRect/>
+          </a:gradFill>
+          <a:ln>
+            <a:noFill/>
+          </a:ln>
+          <a:extLst>
+            <a:ext uri="{C572A759-6A51-4108-AA02-DFA0A04FC94B}">
+              <ma14:wrappingTextBoxFlag xmlns:ma14="http://schemas.microsoft.com/office/mac/drawingml/2011/main" xmlns="" val="1"/>
+            </a:ext>
+          </a:extLst>
+        </p:spPr>
+        <p:style>
+          <a:lnRef idx="1">
+            <a:schemeClr val="accent2"/>
+          </a:lnRef>
+          <a:fillRef idx="2">
+            <a:schemeClr val="accent2"/>
+          </a:fillRef>
+          <a:effectRef idx="1">
+            <a:schemeClr val="accent2"/>
+          </a:effectRef>
+          <a:fontRef idx="minor">
+            <a:schemeClr val="dk1"/>
+          </a:fontRef>
+        </p:style>
+        <p:txBody>
+          <a:bodyPr wrap="square" lIns="0" tIns="0" rIns="0" bIns="0" rtlCol="0" anchor="ctr">
             <a:spAutoFit/>
           </a:bodyPr>
           <a:lstStyle/>
@@ -2792,8 +3042,8 @@
         </p:nvSpPr>
         <p:spPr>
           <a:xfrm>
-            <a:off x="6264700" y="895501"/>
-            <a:ext cx="2741516" cy="5962499"/>
+            <a:off x="6672252" y="895501"/>
+            <a:ext cx="2333963" cy="5962499"/>
           </a:xfrm>
           <a:prstGeom prst="rect">
             <a:avLst/>
@@ -2826,7 +3076,7 @@
           </a:ln>
           <a:extLst>
             <a:ext uri="{C572A759-6A51-4108-AA02-DFA0A04FC94B}">
-              <ma14:wrappingTextBoxFlag xmlns="" xmlns:ma14="http://schemas.microsoft.com/office/mac/drawingml/2011/main" val="1"/>
+              <ma14:wrappingTextBoxFlag xmlns:ma14="http://schemas.microsoft.com/office/mac/drawingml/2011/main" xmlns="" val="1"/>
             </a:ext>
           </a:extLst>
         </p:spPr>
@@ -2894,10 +3144,10 @@
       </p:sp>
       <p:sp>
         <p:nvSpPr>
-          <p:cNvPr id="9" name="Folded Corner 8">
+          <p:cNvPr id="10" name="Curved Left Arrow 9">
             <a:extLst>
               <a:ext uri="{FF2B5EF4-FFF2-40B4-BE49-F238E27FC236}">
-                <a16:creationId xmlns:a16="http://schemas.microsoft.com/office/drawing/2014/main" id="{7F488CC9-D387-BE44-A014-E5BC78D9C447}"/>
+                <a16:creationId xmlns:a16="http://schemas.microsoft.com/office/drawing/2014/main" id="{CBC84612-49FC-2842-8EEF-CC24D14B9F08}"/>
               </a:ext>
             </a:extLst>
           </p:cNvPr>
@@ -2905,8 +3155,196 @@
           <p:nvPr/>
         </p:nvSpPr>
         <p:spPr>
+          <a:xfrm rot="10800000">
+            <a:off x="220521" y="2561794"/>
+            <a:ext cx="389466" cy="914400"/>
+          </a:xfrm>
+          <a:prstGeom prst="curvedLeftArrow">
+            <a:avLst>
+              <a:gd name="adj1" fmla="val 58332"/>
+              <a:gd name="adj2" fmla="val 112757"/>
+              <a:gd name="adj3" fmla="val 54348"/>
+            </a:avLst>
+          </a:prstGeom>
+          <a:ln/>
+          <a:extLst>
+            <a:ext uri="{C572A759-6A51-4108-AA02-DFA0A04FC94B}">
+              <ma14:wrappingTextBoxFlag xmlns:ma14="http://schemas.microsoft.com/office/mac/drawingml/2011/main" xmlns="" val="1"/>
+            </a:ext>
+          </a:extLst>
+        </p:spPr>
+        <p:style>
+          <a:lnRef idx="1">
+            <a:schemeClr val="accent1"/>
+          </a:lnRef>
+          <a:fillRef idx="2">
+            <a:schemeClr val="accent1"/>
+          </a:fillRef>
+          <a:effectRef idx="1">
+            <a:schemeClr val="accent1"/>
+          </a:effectRef>
+          <a:fontRef idx="minor">
+            <a:schemeClr val="dk1"/>
+          </a:fontRef>
+        </p:style>
+        <p:txBody>
+          <a:bodyPr wrap="none" lIns="0" tIns="0" rIns="0" bIns="0" rtlCol="0" anchor="ctr">
+            <a:spAutoFit/>
+          </a:bodyPr>
+          <a:lstStyle/>
+          <a:p>
+            <a:pPr algn="ctr"/>
+            <a:endParaRPr lang="en-US" sz="2400" i="0" dirty="0">
+              <a:solidFill>
+                <a:schemeClr val="tx1"/>
+              </a:solidFill>
+              <a:uFill>
+                <a:solidFill/>
+              </a:uFill>
+              <a:latin typeface="+mj-lt"/>
+            </a:endParaRPr>
+          </a:p>
+        </p:txBody>
+      </p:sp>
+      <p:sp>
+        <p:nvSpPr>
+          <p:cNvPr id="11" name="TextBox 10">
+            <a:extLst>
+              <a:ext uri="{FF2B5EF4-FFF2-40B4-BE49-F238E27FC236}">
+                <a16:creationId xmlns:a16="http://schemas.microsoft.com/office/drawing/2014/main" id="{A35AE6AD-4981-0448-8C35-B26C4CD16873}"/>
+              </a:ext>
+            </a:extLst>
+          </p:cNvPr>
+          <p:cNvSpPr txBox="1"/>
+          <p:nvPr/>
+        </p:nvSpPr>
+        <p:spPr>
           <a:xfrm>
-            <a:off x="1479535" y="1752953"/>
+            <a:off x="-84752" y="3533999"/>
+            <a:ext cx="853502" cy="830997"/>
+          </a:xfrm>
+          <a:prstGeom prst="rect">
+            <a:avLst/>
+          </a:prstGeom>
+          <a:noFill/>
+        </p:spPr>
+        <p:txBody>
+          <a:bodyPr wrap="square" rtlCol="0">
+            <a:spAutoFit/>
+          </a:bodyPr>
+          <a:lstStyle/>
+          <a:p>
+            <a:pPr algn="ctr"/>
+            <a:r>
+              <a:rPr lang="en-US" sz="2400" i="0" dirty="0">
+                <a:latin typeface="+mj-lt"/>
+              </a:rPr>
+              <a:t>Edit file</a:t>
+            </a:r>
+          </a:p>
+        </p:txBody>
+      </p:sp>
+      <p:sp>
+        <p:nvSpPr>
+          <p:cNvPr id="12" name="TextBox 11">
+            <a:extLst>
+              <a:ext uri="{FF2B5EF4-FFF2-40B4-BE49-F238E27FC236}">
+                <a16:creationId xmlns:a16="http://schemas.microsoft.com/office/drawing/2014/main" id="{972378B0-DE8F-4E49-859A-F53ECA42AE6B}"/>
+              </a:ext>
+            </a:extLst>
+          </p:cNvPr>
+          <p:cNvSpPr txBox="1"/>
+          <p:nvPr/>
+        </p:nvSpPr>
+        <p:spPr>
+          <a:xfrm>
+            <a:off x="232858" y="1398488"/>
+            <a:ext cx="1941878" cy="461665"/>
+          </a:xfrm>
+          <a:prstGeom prst="rect">
+            <a:avLst/>
+          </a:prstGeom>
+          <a:noFill/>
+        </p:spPr>
+        <p:txBody>
+          <a:bodyPr wrap="none" rtlCol="0">
+            <a:spAutoFit/>
+          </a:bodyPr>
+          <a:lstStyle/>
+          <a:p>
+            <a:r>
+              <a:rPr lang="en-US" sz="2400" i="0" dirty="0">
+                <a:latin typeface="+mj-lt"/>
+              </a:rPr>
+              <a:t>Working files</a:t>
+            </a:r>
+          </a:p>
+        </p:txBody>
+      </p:sp>
+      <p:sp>
+        <p:nvSpPr>
+          <p:cNvPr id="13" name="TextBox 12">
+            <a:extLst>
+              <a:ext uri="{FF2B5EF4-FFF2-40B4-BE49-F238E27FC236}">
+                <a16:creationId xmlns:a16="http://schemas.microsoft.com/office/drawing/2014/main" id="{059CC321-E940-594E-9BAF-75B1A60FE066}"/>
+              </a:ext>
+            </a:extLst>
+          </p:cNvPr>
+          <p:cNvSpPr txBox="1"/>
+          <p:nvPr/>
+        </p:nvSpPr>
+        <p:spPr>
+          <a:xfrm>
+            <a:off x="370492" y="4751847"/>
+            <a:ext cx="1569982" cy="830997"/>
+          </a:xfrm>
+          <a:prstGeom prst="rect">
+            <a:avLst/>
+          </a:prstGeom>
+          <a:noFill/>
+        </p:spPr>
+        <p:txBody>
+          <a:bodyPr wrap="none" rtlCol="0">
+            <a:spAutoFit/>
+          </a:bodyPr>
+          <a:lstStyle/>
+          <a:p>
+            <a:pPr algn="ctr"/>
+            <a:r>
+              <a:rPr lang="en-US" sz="2400" i="0" dirty="0">
+                <a:latin typeface="+mj-lt"/>
+              </a:rPr>
+              <a:t>Visible </a:t>
+            </a:r>
+            <a:br>
+              <a:rPr lang="en-US" sz="2400" i="0" dirty="0">
+                <a:latin typeface="+mj-lt"/>
+              </a:rPr>
+            </a:br>
+            <a:r>
+              <a:rPr lang="en-US" sz="2400" i="0" dirty="0">
+                <a:latin typeface="+mj-lt"/>
+              </a:rPr>
+              <a:t>file system</a:t>
+            </a:r>
+          </a:p>
+        </p:txBody>
+      </p:sp>
+      <p:sp>
+        <p:nvSpPr>
+          <p:cNvPr id="14" name="Folded Corner 13">
+            <a:extLst>
+              <a:ext uri="{FF2B5EF4-FFF2-40B4-BE49-F238E27FC236}">
+                <a16:creationId xmlns:a16="http://schemas.microsoft.com/office/drawing/2014/main" id="{A420E241-0D49-4A43-B091-ED6F0705C5EC}"/>
+              </a:ext>
+            </a:extLst>
+          </p:cNvPr>
+          <p:cNvSpPr/>
+          <p:nvPr/>
+        </p:nvSpPr>
+        <p:spPr>
+          <a:xfrm>
+            <a:off x="5101962" y="2299624"/>
             <a:ext cx="1236717" cy="1649873"/>
           </a:xfrm>
           <a:prstGeom prst="foldedCorner">
@@ -2917,7 +3355,7 @@
           <a:ln/>
           <a:extLst>
             <a:ext uri="{C572A759-6A51-4108-AA02-DFA0A04FC94B}">
-              <ma14:wrappingTextBoxFlag xmlns="" xmlns:ma14="http://schemas.microsoft.com/office/mac/drawingml/2011/main" val="1"/>
+              <ma14:wrappingTextBoxFlag xmlns:ma14="http://schemas.microsoft.com/office/mac/drawingml/2011/main" xmlns="" val="1"/>
             </a:ext>
           </a:extLst>
         </p:spPr>
@@ -2953,10 +3391,10 @@
       </p:sp>
       <p:sp>
         <p:nvSpPr>
-          <p:cNvPr id="10" name="Curved Left Arrow 9">
+          <p:cNvPr id="15" name="Folded Corner 14">
             <a:extLst>
               <a:ext uri="{FF2B5EF4-FFF2-40B4-BE49-F238E27FC236}">
-                <a16:creationId xmlns:a16="http://schemas.microsoft.com/office/drawing/2014/main" id="{CBC84612-49FC-2842-8EEF-CC24D14B9F08}"/>
+                <a16:creationId xmlns:a16="http://schemas.microsoft.com/office/drawing/2014/main" id="{9F8B267D-D172-4349-9C68-1F55BA0261B1}"/>
               </a:ext>
             </a:extLst>
           </p:cNvPr>
@@ -2964,196 +3402,8 @@
           <p:nvPr/>
         </p:nvSpPr>
         <p:spPr>
-          <a:xfrm rot="10800000">
-            <a:off x="875573" y="1899993"/>
-            <a:ext cx="389466" cy="914400"/>
-          </a:xfrm>
-          <a:prstGeom prst="curvedLeftArrow">
-            <a:avLst>
-              <a:gd name="adj1" fmla="val 58332"/>
-              <a:gd name="adj2" fmla="val 112757"/>
-              <a:gd name="adj3" fmla="val 54348"/>
-            </a:avLst>
-          </a:prstGeom>
-          <a:ln/>
-          <a:extLst>
-            <a:ext uri="{C572A759-6A51-4108-AA02-DFA0A04FC94B}">
-              <ma14:wrappingTextBoxFlag xmlns="" xmlns:ma14="http://schemas.microsoft.com/office/mac/drawingml/2011/main" val="1"/>
-            </a:ext>
-          </a:extLst>
-        </p:spPr>
-        <p:style>
-          <a:lnRef idx="1">
-            <a:schemeClr val="accent1"/>
-          </a:lnRef>
-          <a:fillRef idx="2">
-            <a:schemeClr val="accent1"/>
-          </a:fillRef>
-          <a:effectRef idx="1">
-            <a:schemeClr val="accent1"/>
-          </a:effectRef>
-          <a:fontRef idx="minor">
-            <a:schemeClr val="dk1"/>
-          </a:fontRef>
-        </p:style>
-        <p:txBody>
-          <a:bodyPr wrap="none" lIns="0" tIns="0" rIns="0" bIns="0" rtlCol="0" anchor="ctr">
-            <a:spAutoFit/>
-          </a:bodyPr>
-          <a:lstStyle/>
-          <a:p>
-            <a:pPr algn="ctr"/>
-            <a:endParaRPr lang="en-US" sz="2400" i="0" dirty="0">
-              <a:solidFill>
-                <a:schemeClr val="tx1"/>
-              </a:solidFill>
-              <a:uFill>
-                <a:solidFill/>
-              </a:uFill>
-              <a:latin typeface="+mj-lt"/>
-            </a:endParaRPr>
-          </a:p>
-        </p:txBody>
-      </p:sp>
-      <p:sp>
-        <p:nvSpPr>
-          <p:cNvPr id="11" name="TextBox 10">
-            <a:extLst>
-              <a:ext uri="{FF2B5EF4-FFF2-40B4-BE49-F238E27FC236}">
-                <a16:creationId xmlns:a16="http://schemas.microsoft.com/office/drawing/2014/main" id="{A35AE6AD-4981-0448-8C35-B26C4CD16873}"/>
-              </a:ext>
-            </a:extLst>
-          </p:cNvPr>
-          <p:cNvSpPr txBox="1"/>
-          <p:nvPr/>
-        </p:nvSpPr>
-        <p:spPr>
           <a:xfrm>
-            <a:off x="45030" y="2126360"/>
-            <a:ext cx="853502" cy="830997"/>
-          </a:xfrm>
-          <a:prstGeom prst="rect">
-            <a:avLst/>
-          </a:prstGeom>
-          <a:noFill/>
-        </p:spPr>
-        <p:txBody>
-          <a:bodyPr wrap="square" rtlCol="0">
-            <a:spAutoFit/>
-          </a:bodyPr>
-          <a:lstStyle/>
-          <a:p>
-            <a:pPr algn="ctr"/>
-            <a:r>
-              <a:rPr lang="en-US" sz="2400" i="0" dirty="0">
-                <a:latin typeface="+mj-lt"/>
-              </a:rPr>
-              <a:t>Edit file</a:t>
-            </a:r>
-          </a:p>
-        </p:txBody>
-      </p:sp>
-      <p:sp>
-        <p:nvSpPr>
-          <p:cNvPr id="12" name="TextBox 11">
-            <a:extLst>
-              <a:ext uri="{FF2B5EF4-FFF2-40B4-BE49-F238E27FC236}">
-                <a16:creationId xmlns:a16="http://schemas.microsoft.com/office/drawing/2014/main" id="{972378B0-DE8F-4E49-859A-F53ECA42AE6B}"/>
-              </a:ext>
-            </a:extLst>
-          </p:cNvPr>
-          <p:cNvSpPr txBox="1"/>
-          <p:nvPr/>
-        </p:nvSpPr>
-        <p:spPr>
-          <a:xfrm>
-            <a:off x="791214" y="1185253"/>
-            <a:ext cx="1941878" cy="461665"/>
-          </a:xfrm>
-          <a:prstGeom prst="rect">
-            <a:avLst/>
-          </a:prstGeom>
-          <a:noFill/>
-        </p:spPr>
-        <p:txBody>
-          <a:bodyPr wrap="none" rtlCol="0">
-            <a:spAutoFit/>
-          </a:bodyPr>
-          <a:lstStyle/>
-          <a:p>
-            <a:r>
-              <a:rPr lang="en-US" sz="2400" i="0" dirty="0">
-                <a:latin typeface="+mj-lt"/>
-              </a:rPr>
-              <a:t>Working files</a:t>
-            </a:r>
-          </a:p>
-        </p:txBody>
-      </p:sp>
-      <p:sp>
-        <p:nvSpPr>
-          <p:cNvPr id="13" name="TextBox 12">
-            <a:extLst>
-              <a:ext uri="{FF2B5EF4-FFF2-40B4-BE49-F238E27FC236}">
-                <a16:creationId xmlns:a16="http://schemas.microsoft.com/office/drawing/2014/main" id="{059CC321-E940-594E-9BAF-75B1A60FE066}"/>
-              </a:ext>
-            </a:extLst>
-          </p:cNvPr>
-          <p:cNvSpPr txBox="1"/>
-          <p:nvPr/>
-        </p:nvSpPr>
-        <p:spPr>
-          <a:xfrm>
-            <a:off x="849604" y="5918278"/>
-            <a:ext cx="1569982" cy="830997"/>
-          </a:xfrm>
-          <a:prstGeom prst="rect">
-            <a:avLst/>
-          </a:prstGeom>
-          <a:noFill/>
-        </p:spPr>
-        <p:txBody>
-          <a:bodyPr wrap="none" rtlCol="0">
-            <a:spAutoFit/>
-          </a:bodyPr>
-          <a:lstStyle/>
-          <a:p>
-            <a:pPr algn="ctr"/>
-            <a:r>
-              <a:rPr lang="en-US" sz="2400" i="0" dirty="0">
-                <a:latin typeface="+mj-lt"/>
-              </a:rPr>
-              <a:t>Visible </a:t>
-            </a:r>
-            <a:br>
-              <a:rPr lang="en-US" sz="2400" i="0" dirty="0">
-                <a:latin typeface="+mj-lt"/>
-              </a:rPr>
-            </a:br>
-            <a:r>
-              <a:rPr lang="en-US" sz="2400" i="0" dirty="0">
-                <a:latin typeface="+mj-lt"/>
-              </a:rPr>
-              <a:t>file system</a:t>
-            </a:r>
-          </a:p>
-        </p:txBody>
-      </p:sp>
-      <p:sp>
-        <p:nvSpPr>
-          <p:cNvPr id="14" name="Folded Corner 13">
-            <a:extLst>
-              <a:ext uri="{FF2B5EF4-FFF2-40B4-BE49-F238E27FC236}">
-                <a16:creationId xmlns:a16="http://schemas.microsoft.com/office/drawing/2014/main" id="{A420E241-0D49-4A43-B091-ED6F0705C5EC}"/>
-              </a:ext>
-            </a:extLst>
-          </p:cNvPr>
-          <p:cNvSpPr/>
-          <p:nvPr/>
-        </p:nvSpPr>
-        <p:spPr>
-          <a:xfrm>
-            <a:off x="4274207" y="2481857"/>
+            <a:off x="7234610" y="2299624"/>
             <a:ext cx="1236717" cy="1649873"/>
           </a:xfrm>
           <a:prstGeom prst="foldedCorner">
@@ -3164,7 +3414,7 @@
           <a:ln/>
           <a:extLst>
             <a:ext uri="{C572A759-6A51-4108-AA02-DFA0A04FC94B}">
-              <ma14:wrappingTextBoxFlag xmlns="" xmlns:ma14="http://schemas.microsoft.com/office/mac/drawingml/2011/main" val="1"/>
+              <ma14:wrappingTextBoxFlag xmlns:ma14="http://schemas.microsoft.com/office/mac/drawingml/2011/main" xmlns="" val="1"/>
             </a:ext>
           </a:extLst>
         </p:spPr>
@@ -3200,65 +3450,6 @@
       </p:sp>
       <p:sp>
         <p:nvSpPr>
-          <p:cNvPr id="15" name="Folded Corner 14">
-            <a:extLst>
-              <a:ext uri="{FF2B5EF4-FFF2-40B4-BE49-F238E27FC236}">
-                <a16:creationId xmlns:a16="http://schemas.microsoft.com/office/drawing/2014/main" id="{9F8B267D-D172-4349-9C68-1F55BA0261B1}"/>
-              </a:ext>
-            </a:extLst>
-          </p:cNvPr>
-          <p:cNvSpPr/>
-          <p:nvPr/>
-        </p:nvSpPr>
-        <p:spPr>
-          <a:xfrm>
-            <a:off x="7175763" y="2481857"/>
-            <a:ext cx="1236717" cy="1649873"/>
-          </a:xfrm>
-          <a:prstGeom prst="foldedCorner">
-            <a:avLst>
-              <a:gd name="adj" fmla="val 28990"/>
-            </a:avLst>
-          </a:prstGeom>
-          <a:ln/>
-          <a:extLst>
-            <a:ext uri="{C572A759-6A51-4108-AA02-DFA0A04FC94B}">
-              <ma14:wrappingTextBoxFlag xmlns="" xmlns:ma14="http://schemas.microsoft.com/office/mac/drawingml/2011/main" val="1"/>
-            </a:ext>
-          </a:extLst>
-        </p:spPr>
-        <p:style>
-          <a:lnRef idx="1">
-            <a:schemeClr val="dk1"/>
-          </a:lnRef>
-          <a:fillRef idx="2">
-            <a:schemeClr val="dk1"/>
-          </a:fillRef>
-          <a:effectRef idx="1">
-            <a:schemeClr val="dk1"/>
-          </a:effectRef>
-          <a:fontRef idx="minor">
-            <a:schemeClr val="dk1"/>
-          </a:fontRef>
-        </p:style>
-        <p:txBody>
-          <a:bodyPr wrap="square" lIns="0" tIns="0" rIns="0" bIns="0" rtlCol="0" anchor="ctr">
-            <a:noAutofit/>
-          </a:bodyPr>
-          <a:lstStyle/>
-          <a:p>
-            <a:pPr algn="ctr"/>
-            <a:endParaRPr lang="en-US" sz="2400" i="0" dirty="0">
-              <a:uFill>
-                <a:solidFill/>
-              </a:uFill>
-              <a:latin typeface="+mj-lt"/>
-            </a:endParaRPr>
-          </a:p>
-        </p:txBody>
-      </p:sp>
-      <p:sp>
-        <p:nvSpPr>
           <p:cNvPr id="16" name="Right Arrow 15">
             <a:extLst>
               <a:ext uri="{FF2B5EF4-FFF2-40B4-BE49-F238E27FC236}">
@@ -3270,9 +3461,9 @@
           <p:nvPr/>
         </p:nvSpPr>
         <p:spPr>
-          <a:xfrm rot="1402777">
-            <a:off x="2802936" y="2280396"/>
-            <a:ext cx="1371600" cy="611386"/>
+          <a:xfrm>
+            <a:off x="3736112" y="2490588"/>
+            <a:ext cx="1575401" cy="901381"/>
           </a:xfrm>
           <a:prstGeom prst="rightArrow">
             <a:avLst/>
@@ -3280,7 +3471,7 @@
           <a:ln/>
           <a:extLst>
             <a:ext uri="{C572A759-6A51-4108-AA02-DFA0A04FC94B}">
-              <ma14:wrappingTextBoxFlag xmlns="" xmlns:ma14="http://schemas.microsoft.com/office/mac/drawingml/2011/main" val="1"/>
+              <ma14:wrappingTextBoxFlag xmlns:ma14="http://schemas.microsoft.com/office/mac/drawingml/2011/main" xmlns="" val="1"/>
             </a:ext>
           </a:extLst>
         </p:spPr>
@@ -3340,7 +3531,7 @@
         </p:nvSpPr>
         <p:spPr>
           <a:xfrm>
-            <a:off x="5748412" y="3001100"/>
+            <a:off x="5886465" y="2635585"/>
             <a:ext cx="1371600" cy="611386"/>
           </a:xfrm>
           <a:prstGeom prst="rightArrow">
@@ -3349,7 +3540,7 @@
           <a:ln/>
           <a:extLst>
             <a:ext uri="{C572A759-6A51-4108-AA02-DFA0A04FC94B}">
-              <ma14:wrappingTextBoxFlag xmlns="" xmlns:ma14="http://schemas.microsoft.com/office/mac/drawingml/2011/main" val="1"/>
+              <ma14:wrappingTextBoxFlag xmlns:ma14="http://schemas.microsoft.com/office/mac/drawingml/2011/main" xmlns="" val="1"/>
             </a:ext>
           </a:extLst>
         </p:spPr>
@@ -3409,8 +3600,8 @@
         </p:nvSpPr>
         <p:spPr>
           <a:xfrm>
-            <a:off x="2879767" y="3130411"/>
-            <a:ext cx="1193738" cy="544830"/>
+            <a:off x="3886444" y="3677083"/>
+            <a:ext cx="1371111" cy="544830"/>
           </a:xfrm>
           <a:prstGeom prst="wedgeRoundRectCallout">
             <a:avLst>
@@ -3422,7 +3613,7 @@
           <a:ln/>
           <a:extLst>
             <a:ext uri="{C572A759-6A51-4108-AA02-DFA0A04FC94B}">
-              <ma14:wrappingTextBoxFlag xmlns="" xmlns:ma14="http://schemas.microsoft.com/office/mac/drawingml/2011/main" val="1"/>
+              <ma14:wrappingTextBoxFlag xmlns:ma14="http://schemas.microsoft.com/office/mac/drawingml/2011/main" xmlns="" val="1"/>
             </a:ext>
           </a:extLst>
         </p:spPr>
@@ -3473,7 +3664,7 @@
         </p:nvSpPr>
         <p:spPr>
           <a:xfrm>
-            <a:off x="3905445" y="5846637"/>
+            <a:off x="4380023" y="4751847"/>
             <a:ext cx="1947286" cy="830997"/>
           </a:xfrm>
           <a:prstGeom prst="rect">
@@ -3523,7 +3714,7 @@
         </p:nvSpPr>
         <p:spPr>
           <a:xfrm>
-            <a:off x="6767153" y="5846636"/>
+            <a:off x="6767153" y="4751847"/>
             <a:ext cx="1947286" cy="830997"/>
           </a:xfrm>
           <a:prstGeom prst="rect">
@@ -3573,7 +3764,7 @@
         </p:nvSpPr>
         <p:spPr>
           <a:xfrm>
-            <a:off x="5605116" y="4562717"/>
+            <a:off x="5915443" y="4140461"/>
             <a:ext cx="1319167" cy="611386"/>
           </a:xfrm>
           <a:prstGeom prst="leftArrow">
@@ -3582,7 +3773,7 @@
           <a:ln/>
           <a:extLst>
             <a:ext uri="{C572A759-6A51-4108-AA02-DFA0A04FC94B}">
-              <ma14:wrappingTextBoxFlag xmlns="" xmlns:ma14="http://schemas.microsoft.com/office/mac/drawingml/2011/main" val="1"/>
+              <ma14:wrappingTextBoxFlag xmlns:ma14="http://schemas.microsoft.com/office/mac/drawingml/2011/main" xmlns="" val="1"/>
             </a:ext>
           </a:extLst>
         </p:spPr>
@@ -3630,120 +3821,38 @@
       </p:sp>
       <p:sp>
         <p:nvSpPr>
-          <p:cNvPr id="29" name="Rounded Rectangular Callout 28">
+          <p:cNvPr id="30" name="TextBox 29">
             <a:extLst>
               <a:ext uri="{FF2B5EF4-FFF2-40B4-BE49-F238E27FC236}">
-                <a16:creationId xmlns:a16="http://schemas.microsoft.com/office/drawing/2014/main" id="{EFE06E44-0D3B-4947-BC38-FE0D4C128E31}"/>
+                <a16:creationId xmlns:a16="http://schemas.microsoft.com/office/drawing/2014/main" id="{067DA535-9D51-4D4C-8A64-394DEEF75763}"/>
               </a:ext>
             </a:extLst>
           </p:cNvPr>
-          <p:cNvSpPr/>
+          <p:cNvSpPr txBox="1"/>
           <p:nvPr/>
         </p:nvSpPr>
         <p:spPr>
           <a:xfrm>
-            <a:off x="474341" y="4166342"/>
-            <a:ext cx="2108071" cy="1362075"/>
+            <a:off x="2347863" y="4936513"/>
+            <a:ext cx="1947286" cy="461665"/>
           </a:xfrm>
-          <a:prstGeom prst="wedgeRoundRectCallout">
-            <a:avLst>
-              <a:gd name="adj1" fmla="val 17198"/>
-              <a:gd name="adj2" fmla="val -93734"/>
-              <a:gd name="adj3" fmla="val 16667"/>
-            </a:avLst>
+          <a:prstGeom prst="rect">
+            <a:avLst/>
           </a:prstGeom>
-          <a:ln/>
-          <a:extLst>
-            <a:ext uri="{C572A759-6A51-4108-AA02-DFA0A04FC94B}">
-              <ma14:wrappingTextBoxFlag xmlns="" xmlns:ma14="http://schemas.microsoft.com/office/mac/drawingml/2011/main" val="1"/>
-            </a:ext>
-          </a:extLst>
+          <a:noFill/>
         </p:spPr>
-        <p:style>
-          <a:lnRef idx="1">
-            <a:schemeClr val="accent5"/>
-          </a:lnRef>
-          <a:fillRef idx="2">
-            <a:schemeClr val="accent5"/>
-          </a:fillRef>
-          <a:effectRef idx="1">
-            <a:schemeClr val="accent5"/>
-          </a:effectRef>
-          <a:fontRef idx="minor">
-            <a:schemeClr val="dk1"/>
-          </a:fontRef>
-        </p:style>
-        <p:txBody>
-          <a:bodyPr wrap="square" lIns="0" tIns="0" rIns="0" bIns="0" rtlCol="0" anchor="ctr">
+        <p:txBody>
+          <a:bodyPr wrap="square" rtlCol="0">
             <a:spAutoFit/>
           </a:bodyPr>
           <a:lstStyle/>
           <a:p>
             <a:pPr algn="ctr"/>
             <a:r>
-              <a:rPr lang="en-US" sz="1600" b="1" i="0" dirty="0">
-                <a:uFill>
-                  <a:solidFill/>
-                </a:uFill>
+              <a:rPr lang="en-US" sz="2400" i="0" dirty="0">
                 <a:latin typeface="+mj-lt"/>
               </a:rPr>
-              <a:t>Use </a:t>
-            </a:r>
-            <a:r>
-              <a:rPr lang="en-US" sz="1600" b="1" i="0" dirty="0" err="1">
-                <a:uFill>
-                  <a:solidFill/>
-                </a:uFill>
-                <a:latin typeface="+mj-lt"/>
-              </a:rPr>
-              <a:t>git</a:t>
-            </a:r>
-            <a:r>
-              <a:rPr lang="en-US" sz="1600" b="1" i="0" dirty="0">
-                <a:uFill>
-                  <a:solidFill/>
-                </a:uFill>
-                <a:latin typeface="+mj-lt"/>
-              </a:rPr>
-              <a:t> add </a:t>
-            </a:r>
-            <a:r>
-              <a:rPr lang="en-US" sz="1600" b="1" dirty="0">
-                <a:latin typeface="+mj-lt"/>
-              </a:rPr>
-              <a:t>before first commit </a:t>
-            </a:r>
-            <a:br>
-              <a:rPr lang="en-US" sz="1600" b="1" dirty="0">
-                <a:latin typeface="+mj-lt"/>
-              </a:rPr>
-            </a:br>
-            <a:r>
-              <a:rPr lang="en-US" sz="1600" i="0" dirty="0">
-                <a:uFill>
-                  <a:solidFill/>
-                </a:uFill>
-                <a:latin typeface="+mj-lt"/>
-              </a:rPr>
-              <a:t>This tells </a:t>
-            </a:r>
-            <a:r>
-              <a:rPr lang="en-US" sz="1600" i="0" dirty="0" err="1">
-                <a:uFill>
-                  <a:solidFill/>
-                </a:uFill>
-                <a:latin typeface="+mj-lt"/>
-              </a:rPr>
-              <a:t>git</a:t>
-            </a:r>
-            <a:r>
-              <a:rPr lang="en-US" sz="1600" i="0" dirty="0">
-                <a:uFill>
-                  <a:solidFill/>
-                </a:uFill>
-                <a:latin typeface="+mj-lt"/>
-              </a:rPr>
-              <a:t> to add a file to its “index” or “staging area”</a:t>
+              <a:t>Staging area</a:t>
             </a:r>
           </a:p>
         </p:txBody>
@@ -3751,7 +3860,7 @@
     </p:spTree>
     <p:extLst>
       <p:ext uri="{BB962C8B-B14F-4D97-AF65-F5344CB8AC3E}">
-        <p14:creationId xmlns:p14="http://schemas.microsoft.com/office/powerpoint/2010/main" val="1542998054"/>
+        <p14:creationId xmlns:p14="http://schemas.microsoft.com/office/powerpoint/2010/main" val="1315122504"/>
       </p:ext>
     </p:extLst>
   </p:cSld>
@@ -4051,7 +4160,7 @@
         <a:ln/>
         <a:extLst>
           <a:ext uri="{C572A759-6A51-4108-AA02-DFA0A04FC94B}">
-            <ma14:wrappingTextBoxFlag xmlns="" xmlns:ma14="http://schemas.microsoft.com/office/mac/drawingml/2011/main" val="1"/>
+            <ma14:wrappingTextBoxFlag xmlns:ma14="http://schemas.microsoft.com/office/mac/drawingml/2011/main" xmlns="" val="1"/>
           </a:ext>
         </a:extLst>
       </a:spPr>

</xml_diff>